<commit_message>
Added intro to genome assembly
</commit_message>
<xml_diff>
--- a/JavanIntroSlides/Introduction_metagenomics.pptx
+++ b/JavanIntroSlides/Introduction_metagenomics.pptx
@@ -14298,7 +14298,7 @@
         <p:spPr>
           <a:xfrm>
             <a:off x="535940" y="471783"/>
-            <a:ext cx="8073390" cy="5831205"/>
+            <a:ext cx="8073390" cy="5094985"/>
           </a:xfrm>
           <a:prstGeom prst="rect">
             <a:avLst/>
@@ -14359,7 +14359,7 @@
               </a:rPr>
               <a:t>assembly</a:t>
             </a:r>
-            <a:endParaRPr sz="2800">
+            <a:endParaRPr sz="2800" dirty="0">
               <a:latin typeface="Arial"/>
               <a:cs typeface="Arial"/>
             </a:endParaRPr>
@@ -14399,10 +14399,6 @@
               </a:rPr>
               <a:t>used</a:t>
             </a:r>
-            <a:endParaRPr sz="2600">
-              <a:latin typeface="Arial MT"/>
-              <a:cs typeface="Arial MT"/>
-            </a:endParaRPr>
           </a:p>
           <a:p>
             <a:pPr marL="1155700" lvl="2" indent="-229235">
@@ -14420,67 +14416,55 @@
               </a:tabLst>
             </a:pPr>
             <a:r>
-              <a:rPr sz="2200" spc="-5" dirty="0">
-                <a:latin typeface="Arial MT"/>
-                <a:cs typeface="Arial MT"/>
-              </a:rPr>
-              <a:t>Newbler</a:t>
-            </a:r>
-            <a:endParaRPr sz="2200">
-              <a:latin typeface="Arial MT"/>
-              <a:cs typeface="Arial MT"/>
-            </a:endParaRPr>
-          </a:p>
-          <a:p>
-            <a:pPr marL="1155700" lvl="2" indent="-229235">
-              <a:lnSpc>
-                <a:spcPct val="100000"/>
-              </a:lnSpc>
-              <a:spcBef>
-                <a:spcPts val="525"/>
-              </a:spcBef>
-              <a:buSzPct val="95454"/>
-              <a:buFont typeface="Wingdings"/>
-              <a:buChar char=""/>
-              <a:tabLst>
-                <a:tab pos="1156335" algn="l"/>
-              </a:tabLst>
-            </a:pPr>
-            <a:r>
-              <a:rPr sz="2200" spc="-5" dirty="0">
-                <a:latin typeface="Arial MT"/>
-                <a:cs typeface="Arial MT"/>
-              </a:rPr>
-              <a:t>AMOS</a:t>
-            </a:r>
-            <a:endParaRPr sz="2200">
-              <a:latin typeface="Arial MT"/>
-              <a:cs typeface="Arial MT"/>
-            </a:endParaRPr>
-          </a:p>
-          <a:p>
-            <a:pPr marL="1155700" lvl="2" indent="-229235">
-              <a:lnSpc>
-                <a:spcPct val="100000"/>
-              </a:lnSpc>
-              <a:spcBef>
-                <a:spcPts val="535"/>
-              </a:spcBef>
-              <a:buSzPct val="95454"/>
-              <a:buFont typeface="Wingdings"/>
-              <a:buChar char=""/>
-              <a:tabLst>
-                <a:tab pos="1156335" algn="l"/>
-              </a:tabLst>
-            </a:pPr>
-            <a:r>
-              <a:rPr sz="2200" spc="-5" dirty="0">
-                <a:latin typeface="Arial MT"/>
-                <a:cs typeface="Arial MT"/>
-              </a:rPr>
-              <a:t>MIRA</a:t>
-            </a:r>
-            <a:endParaRPr sz="2200">
+              <a:rPr lang="en-US" sz="2200" spc="-5" dirty="0">
+                <a:latin typeface="Arial MT"/>
+                <a:cs typeface="Arial MT"/>
+              </a:rPr>
+              <a:t>Spade [ </a:t>
+            </a:r>
+            <a:r>
+              <a:rPr lang="en-US" sz="2200" spc="-5" dirty="0" err="1">
+                <a:latin typeface="Arial MT"/>
+                <a:cs typeface="Arial MT"/>
+              </a:rPr>
+              <a:t>metaspede</a:t>
+            </a:r>
+            <a:r>
+              <a:rPr lang="en-US" sz="2200" spc="-5" dirty="0">
+                <a:latin typeface="Arial MT"/>
+                <a:cs typeface="Arial MT"/>
+              </a:rPr>
+              <a:t>, </a:t>
+            </a:r>
+            <a:r>
+              <a:rPr lang="en-US" sz="2200" spc="-5" dirty="0" err="1">
+                <a:latin typeface="Arial MT"/>
+                <a:cs typeface="Arial MT"/>
+              </a:rPr>
+              <a:t>metavir</a:t>
+            </a:r>
+            <a:r>
+              <a:rPr lang="en-US" sz="2200" spc="-5" dirty="0">
+                <a:latin typeface="Arial MT"/>
+                <a:cs typeface="Arial MT"/>
+              </a:rPr>
+              <a:t> </a:t>
+            </a:r>
+            <a:r>
+              <a:rPr lang="en-US" sz="2200" spc="-5" dirty="0" err="1">
+                <a:latin typeface="Arial MT"/>
+                <a:cs typeface="Arial MT"/>
+              </a:rPr>
+              <a:t>etc</a:t>
+            </a:r>
+            <a:r>
+              <a:rPr lang="en-US" sz="2200" spc="-5" dirty="0">
+                <a:latin typeface="Arial MT"/>
+                <a:cs typeface="Arial MT"/>
+              </a:rPr>
+              <a:t>]</a:t>
+            </a:r>
+            <a:endParaRPr sz="2200" dirty="0">
               <a:latin typeface="Arial MT"/>
               <a:cs typeface="Arial MT"/>
             </a:endParaRPr>
@@ -14496,7 +14480,7 @@
               <a:buFont typeface="Wingdings"/>
               <a:buChar char=""/>
             </a:pPr>
-            <a:endParaRPr sz="3250">
+            <a:endParaRPr sz="3250" dirty="0">
               <a:latin typeface="Arial MT"/>
               <a:cs typeface="Arial MT"/>
             </a:endParaRPr>
@@ -14652,10 +14636,6 @@
               </a:rPr>
               <a:t>available</a:t>
             </a:r>
-            <a:endParaRPr sz="2600">
-              <a:latin typeface="Arial MT"/>
-              <a:cs typeface="Arial MT"/>
-            </a:endParaRPr>
           </a:p>
           <a:p>
             <a:pPr lvl="1">
@@ -14668,7 +14648,7 @@
               <a:buFont typeface="Wingdings"/>
               <a:buChar char=""/>
             </a:pPr>
-            <a:endParaRPr sz="4300">
+            <a:endParaRPr sz="4300" dirty="0">
               <a:latin typeface="Arial MT"/>
               <a:cs typeface="Arial MT"/>
             </a:endParaRPr>
@@ -14706,7 +14686,7 @@
               </a:rPr>
               <a:t>assembly</a:t>
             </a:r>
-            <a:endParaRPr sz="2800">
+            <a:endParaRPr sz="2800" dirty="0">
               <a:latin typeface="Arial"/>
               <a:cs typeface="Arial"/>
             </a:endParaRPr>
@@ -14760,10 +14740,6 @@
               </a:rPr>
               <a:t>resources</a:t>
             </a:r>
-            <a:endParaRPr sz="2600">
-              <a:latin typeface="Arial MT"/>
-              <a:cs typeface="Arial MT"/>
-            </a:endParaRPr>
           </a:p>
           <a:p>
             <a:pPr marL="1155700" lvl="2" indent="-229235">
@@ -14801,7 +14777,7 @@
               </a:rPr>
               <a:t>graphs</a:t>
             </a:r>
-            <a:endParaRPr sz="2200">
+            <a:endParaRPr sz="2200" dirty="0">
               <a:latin typeface="Arial MT"/>
               <a:cs typeface="Arial MT"/>
             </a:endParaRPr>

</xml_diff>